<commit_message>
update py file content
</commit_message>
<xml_diff>
--- a/Research/Paper/Octopus/figures/figures.pptx
+++ b/Research/Paper/Octopus/figures/figures.pptx
@@ -3049,8 +3049,8 @@
         </p:nvSpPr>
         <p:spPr>
           <a:xfrm>
-            <a:off x="5384800" y="1532238"/>
-            <a:ext cx="1226065" cy="4040659"/>
+            <a:off x="5384800" y="1532239"/>
+            <a:ext cx="1226065" cy="3852562"/>
           </a:xfrm>
           <a:prstGeom prst="roundRect">
             <a:avLst/>
@@ -3176,7 +3176,7 @@
         <p:spPr>
           <a:xfrm>
             <a:off x="3471332" y="4446601"/>
-            <a:ext cx="1429265" cy="1126295"/>
+            <a:ext cx="1429265" cy="938199"/>
           </a:xfrm>
           <a:prstGeom prst="roundRect">
             <a:avLst/>
@@ -3244,15 +3244,15 @@
           <a:p>
             <a:pPr algn="ctr"/>
             <a:r>
-              <a:rPr kumimoji="1" lang="en-US" altLang="zh-CN" smtClean="0"/>
+              <a:rPr kumimoji="1" lang="en-US" altLang="zh-CN" dirty="0" smtClean="0"/>
               <a:t>Order Delivery </a:t>
             </a:r>
             <a:r>
-              <a:rPr kumimoji="1" lang="en-US" altLang="zh-CN"/>
+              <a:rPr kumimoji="1" lang="en-US" altLang="zh-CN" dirty="0"/>
               <a:t>T</a:t>
             </a:r>
             <a:r>
-              <a:rPr kumimoji="1" lang="en-US" altLang="zh-CN" smtClean="0"/>
+              <a:rPr kumimoji="1" lang="en-US" altLang="zh-CN" dirty="0" smtClean="0"/>
               <a:t>ime </a:t>
             </a:r>
             <a:r>
@@ -3260,7 +3260,7 @@
               <a:t>E</a:t>
             </a:r>
             <a:r>
-              <a:rPr kumimoji="1" lang="en-US" altLang="zh-CN" smtClean="0"/>
+              <a:rPr kumimoji="1" lang="en-US" altLang="zh-CN" dirty="0" smtClean="0"/>
               <a:t>stimation</a:t>
             </a:r>
             <a:endParaRPr kumimoji="1" lang="zh-CN" altLang="en-US" dirty="0"/>
@@ -3275,7 +3275,7 @@
         </p:nvSpPr>
         <p:spPr>
           <a:xfrm>
-            <a:off x="7095067" y="3107952"/>
+            <a:off x="7095067" y="4046151"/>
             <a:ext cx="1659466" cy="1338649"/>
           </a:xfrm>
           <a:prstGeom prst="roundRect">
@@ -3309,6 +3309,181 @@
           </a:p>
         </p:txBody>
       </p:sp>
+      <p:cxnSp>
+        <p:nvCxnSpPr>
+          <p:cNvPr id="9" name="直线箭头连接符 8"/>
+          <p:cNvCxnSpPr>
+            <a:stCxn id="3" idx="3"/>
+          </p:cNvCxnSpPr>
+          <p:nvPr/>
+        </p:nvCxnSpPr>
+        <p:spPr>
+          <a:xfrm flipV="1">
+            <a:off x="4900598" y="2095385"/>
+            <a:ext cx="484202" cy="1"/>
+          </a:xfrm>
+          <a:prstGeom prst="straightConnector1">
+            <a:avLst/>
+          </a:prstGeom>
+          <a:ln>
+            <a:tailEnd type="triangle"/>
+          </a:ln>
+        </p:spPr>
+        <p:style>
+          <a:lnRef idx="1">
+            <a:schemeClr val="accent1"/>
+          </a:lnRef>
+          <a:fillRef idx="0">
+            <a:schemeClr val="accent1"/>
+          </a:fillRef>
+          <a:effectRef idx="0">
+            <a:schemeClr val="accent1"/>
+          </a:effectRef>
+          <a:fontRef idx="minor">
+            <a:schemeClr val="tx1"/>
+          </a:fontRef>
+        </p:style>
+      </p:cxnSp>
+      <p:cxnSp>
+        <p:nvCxnSpPr>
+          <p:cNvPr id="12" name="直线箭头连接符 11"/>
+          <p:cNvCxnSpPr>
+            <a:stCxn id="4" idx="3"/>
+          </p:cNvCxnSpPr>
+          <p:nvPr/>
+        </p:nvCxnSpPr>
+        <p:spPr>
+          <a:xfrm>
+            <a:off x="4900598" y="3552567"/>
+            <a:ext cx="484202" cy="0"/>
+          </a:xfrm>
+          <a:prstGeom prst="straightConnector1">
+            <a:avLst/>
+          </a:prstGeom>
+          <a:ln>
+            <a:tailEnd type="triangle"/>
+          </a:ln>
+        </p:spPr>
+        <p:style>
+          <a:lnRef idx="1">
+            <a:schemeClr val="accent1"/>
+          </a:lnRef>
+          <a:fillRef idx="0">
+            <a:schemeClr val="accent1"/>
+          </a:fillRef>
+          <a:effectRef idx="0">
+            <a:schemeClr val="accent1"/>
+          </a:effectRef>
+          <a:fontRef idx="minor">
+            <a:schemeClr val="tx1"/>
+          </a:fontRef>
+        </p:style>
+      </p:cxnSp>
+      <p:cxnSp>
+        <p:nvCxnSpPr>
+          <p:cNvPr id="16" name="直线箭头连接符 15"/>
+          <p:cNvCxnSpPr>
+            <a:stCxn id="5" idx="3"/>
+          </p:cNvCxnSpPr>
+          <p:nvPr/>
+        </p:nvCxnSpPr>
+        <p:spPr>
+          <a:xfrm flipV="1">
+            <a:off x="4900597" y="4915700"/>
+            <a:ext cx="484202" cy="1"/>
+          </a:xfrm>
+          <a:prstGeom prst="straightConnector1">
+            <a:avLst/>
+          </a:prstGeom>
+          <a:ln>
+            <a:tailEnd type="triangle"/>
+          </a:ln>
+        </p:spPr>
+        <p:style>
+          <a:lnRef idx="1">
+            <a:schemeClr val="accent1"/>
+          </a:lnRef>
+          <a:fillRef idx="0">
+            <a:schemeClr val="accent1"/>
+          </a:fillRef>
+          <a:effectRef idx="0">
+            <a:schemeClr val="accent1"/>
+          </a:effectRef>
+          <a:fontRef idx="minor">
+            <a:schemeClr val="tx1"/>
+          </a:fontRef>
+        </p:style>
+      </p:cxnSp>
+      <p:cxnSp>
+        <p:nvCxnSpPr>
+          <p:cNvPr id="21" name="直线箭头连接符 20"/>
+          <p:cNvCxnSpPr>
+            <a:endCxn id="6" idx="1"/>
+          </p:cNvCxnSpPr>
+          <p:nvPr/>
+        </p:nvCxnSpPr>
+        <p:spPr>
+          <a:xfrm>
+            <a:off x="6610865" y="2201561"/>
+            <a:ext cx="484202" cy="1"/>
+          </a:xfrm>
+          <a:prstGeom prst="straightConnector1">
+            <a:avLst/>
+          </a:prstGeom>
+          <a:ln>
+            <a:tailEnd type="triangle"/>
+          </a:ln>
+        </p:spPr>
+        <p:style>
+          <a:lnRef idx="1">
+            <a:schemeClr val="accent1"/>
+          </a:lnRef>
+          <a:fillRef idx="0">
+            <a:schemeClr val="accent1"/>
+          </a:fillRef>
+          <a:effectRef idx="0">
+            <a:schemeClr val="accent1"/>
+          </a:effectRef>
+          <a:fontRef idx="minor">
+            <a:schemeClr val="tx1"/>
+          </a:fontRef>
+        </p:style>
+      </p:cxnSp>
+      <p:cxnSp>
+        <p:nvCxnSpPr>
+          <p:cNvPr id="24" name="直线箭头连接符 23"/>
+          <p:cNvCxnSpPr>
+            <a:endCxn id="7" idx="1"/>
+          </p:cNvCxnSpPr>
+          <p:nvPr/>
+        </p:nvCxnSpPr>
+        <p:spPr>
+          <a:xfrm>
+            <a:off x="6610865" y="4715475"/>
+            <a:ext cx="484202" cy="1"/>
+          </a:xfrm>
+          <a:prstGeom prst="straightConnector1">
+            <a:avLst/>
+          </a:prstGeom>
+          <a:ln>
+            <a:tailEnd type="triangle"/>
+          </a:ln>
+        </p:spPr>
+        <p:style>
+          <a:lnRef idx="1">
+            <a:schemeClr val="accent1"/>
+          </a:lnRef>
+          <a:fillRef idx="0">
+            <a:schemeClr val="accent1"/>
+          </a:fillRef>
+          <a:effectRef idx="0">
+            <a:schemeClr val="accent1"/>
+          </a:effectRef>
+          <a:fontRef idx="minor">
+            <a:schemeClr val="tx1"/>
+          </a:fontRef>
+        </p:style>
+      </p:cxnSp>
     </p:spTree>
     <p:extLst>
       <p:ext uri="{BB962C8B-B14F-4D97-AF65-F5344CB8AC3E}">

</xml_diff>